<commit_message>
Change AddressBook to HealthBook for command sequence diagrams
</commit_message>
<xml_diff>
--- a/docs/diagrams/AddAppointmentSequenceDiagram.pptx
+++ b/docs/diagrams/AddAppointmentSequenceDiagram.pptx
@@ -261,7 +261,7 @@
           <a:p>
             <a:fld id="{5C24EE0F-D845-48DD-AAFC-828C42F8D67C}" type="datetimeFigureOut">
               <a:rPr lang="en-SG" smtClean="0"/>
-              <a:t>11 Nov 2018</a:t>
+              <a:t>12 Nov 2018</a:t>
             </a:fld>
             <a:endParaRPr lang="en-SG"/>
           </a:p>
@@ -461,7 +461,7 @@
           <a:p>
             <a:fld id="{5C24EE0F-D845-48DD-AAFC-828C42F8D67C}" type="datetimeFigureOut">
               <a:rPr lang="en-SG" smtClean="0"/>
-              <a:t>11 Nov 2018</a:t>
+              <a:t>12 Nov 2018</a:t>
             </a:fld>
             <a:endParaRPr lang="en-SG"/>
           </a:p>
@@ -671,7 +671,7 @@
           <a:p>
             <a:fld id="{5C24EE0F-D845-48DD-AAFC-828C42F8D67C}" type="datetimeFigureOut">
               <a:rPr lang="en-SG" smtClean="0"/>
-              <a:t>11 Nov 2018</a:t>
+              <a:t>12 Nov 2018</a:t>
             </a:fld>
             <a:endParaRPr lang="en-SG"/>
           </a:p>
@@ -871,7 +871,7 @@
           <a:p>
             <a:fld id="{5C24EE0F-D845-48DD-AAFC-828C42F8D67C}" type="datetimeFigureOut">
               <a:rPr lang="en-SG" smtClean="0"/>
-              <a:t>11 Nov 2018</a:t>
+              <a:t>12 Nov 2018</a:t>
             </a:fld>
             <a:endParaRPr lang="en-SG"/>
           </a:p>
@@ -1147,7 +1147,7 @@
           <a:p>
             <a:fld id="{5C24EE0F-D845-48DD-AAFC-828C42F8D67C}" type="datetimeFigureOut">
               <a:rPr lang="en-SG" smtClean="0"/>
-              <a:t>11 Nov 2018</a:t>
+              <a:t>12 Nov 2018</a:t>
             </a:fld>
             <a:endParaRPr lang="en-SG"/>
           </a:p>
@@ -1415,7 +1415,7 @@
           <a:p>
             <a:fld id="{5C24EE0F-D845-48DD-AAFC-828C42F8D67C}" type="datetimeFigureOut">
               <a:rPr lang="en-SG" smtClean="0"/>
-              <a:t>11 Nov 2018</a:t>
+              <a:t>12 Nov 2018</a:t>
             </a:fld>
             <a:endParaRPr lang="en-SG"/>
           </a:p>
@@ -1830,7 +1830,7 @@
           <a:p>
             <a:fld id="{5C24EE0F-D845-48DD-AAFC-828C42F8D67C}" type="datetimeFigureOut">
               <a:rPr lang="en-SG" smtClean="0"/>
-              <a:t>11 Nov 2018</a:t>
+              <a:t>12 Nov 2018</a:t>
             </a:fld>
             <a:endParaRPr lang="en-SG"/>
           </a:p>
@@ -1972,7 +1972,7 @@
           <a:p>
             <a:fld id="{5C24EE0F-D845-48DD-AAFC-828C42F8D67C}" type="datetimeFigureOut">
               <a:rPr lang="en-SG" smtClean="0"/>
-              <a:t>11 Nov 2018</a:t>
+              <a:t>12 Nov 2018</a:t>
             </a:fld>
             <a:endParaRPr lang="en-SG"/>
           </a:p>
@@ -2085,7 +2085,7 @@
           <a:p>
             <a:fld id="{5C24EE0F-D845-48DD-AAFC-828C42F8D67C}" type="datetimeFigureOut">
               <a:rPr lang="en-SG" smtClean="0"/>
-              <a:t>11 Nov 2018</a:t>
+              <a:t>12 Nov 2018</a:t>
             </a:fld>
             <a:endParaRPr lang="en-SG"/>
           </a:p>
@@ -2398,7 +2398,7 @@
           <a:p>
             <a:fld id="{5C24EE0F-D845-48DD-AAFC-828C42F8D67C}" type="datetimeFigureOut">
               <a:rPr lang="en-SG" smtClean="0"/>
-              <a:t>11 Nov 2018</a:t>
+              <a:t>12 Nov 2018</a:t>
             </a:fld>
             <a:endParaRPr lang="en-SG"/>
           </a:p>
@@ -2687,7 +2687,7 @@
           <a:p>
             <a:fld id="{5C24EE0F-D845-48DD-AAFC-828C42F8D67C}" type="datetimeFigureOut">
               <a:rPr lang="en-SG" smtClean="0"/>
-              <a:t>11 Nov 2018</a:t>
+              <a:t>12 Nov 2018</a:t>
             </a:fld>
             <a:endParaRPr lang="en-SG"/>
           </a:p>
@@ -2930,7 +2930,7 @@
           <a:p>
             <a:fld id="{5C24EE0F-D845-48DD-AAFC-828C42F8D67C}" type="datetimeFigureOut">
               <a:rPr lang="en-SG" smtClean="0"/>
-              <a:t>11 Nov 2018</a:t>
+              <a:t>12 Nov 2018</a:t>
             </a:fld>
             <a:endParaRPr lang="en-SG"/>
           </a:p>
@@ -4177,7 +4177,7 @@
                   <a:schemeClr val="bg1"/>
                 </a:solidFill>
               </a:rPr>
-              <a:t>:Address</a:t>
+              <a:t>:Health</a:t>
             </a:r>
           </a:p>
           <a:p>
@@ -7064,7 +7064,7 @@
                     <a:schemeClr val="bg1"/>
                   </a:solidFill>
                 </a:rPr>
-                <a:t>VersionedAddressBook</a:t>
+                <a:t>VersionedHealthBook</a:t>
               </a:r>
               <a:endParaRPr lang="en-SG" sz="1400" dirty="0">
                 <a:solidFill>

</xml_diff>